<commit_message>
improved rendering of indented text in XSLF, also improved import content from external slides
git-svn-id: https://svn.apache.org/repos/asf/poi/trunk@1200330 13f79535-47bb-0310-9956-ffa450edef68
</commit_message>
<xml_diff>
--- a/test-data/slideshow/themes.pptx
+++ b/test-data/slideshow/themes.pptx
@@ -304,7 +304,7 @@
             <a:fld id="{1D8BD707-D9CF-40AE-B4C6-C98DA3205C09}" type="datetimeFigureOut">
               <a:rPr lang="en-US" smtClean="0"/>
               <a:pPr/>
-              <a:t>11/3/2011</a:t>
+              <a:t>11/10/2011</a:t>
             </a:fld>
             <a:endParaRPr lang="en-US"/>
           </a:p>
@@ -476,7 +476,7 @@
             <a:fld id="{1D8BD707-D9CF-40AE-B4C6-C98DA3205C09}" type="datetimeFigureOut">
               <a:rPr lang="en-US" smtClean="0"/>
               <a:pPr/>
-              <a:t>11/3/2011</a:t>
+              <a:t>11/10/2011</a:t>
             </a:fld>
             <a:endParaRPr lang="en-US"/>
           </a:p>
@@ -658,7 +658,7 @@
             <a:fld id="{1D8BD707-D9CF-40AE-B4C6-C98DA3205C09}" type="datetimeFigureOut">
               <a:rPr lang="en-US" smtClean="0"/>
               <a:pPr/>
-              <a:t>11/3/2011</a:t>
+              <a:t>11/10/2011</a:t>
             </a:fld>
             <a:endParaRPr lang="en-US"/>
           </a:p>
@@ -901,7 +901,7 @@
           <a:p>
             <a:fld id="{CFEFF436-BCE8-4AA8-BD26-8FDC39A20978}" type="datetimeFigureOut">
               <a:rPr lang="en-US" smtClean="0"/>
-              <a:t>11/3/2011</a:t>
+              <a:t>11/10/2011</a:t>
             </a:fld>
             <a:endParaRPr lang="en-US"/>
           </a:p>
@@ -1071,7 +1071,7 @@
           <a:p>
             <a:fld id="{CFEFF436-BCE8-4AA8-BD26-8FDC39A20978}" type="datetimeFigureOut">
               <a:rPr lang="en-US" smtClean="0"/>
-              <a:t>11/3/2011</a:t>
+              <a:t>11/10/2011</a:t>
             </a:fld>
             <a:endParaRPr lang="en-US"/>
           </a:p>
@@ -1317,7 +1317,7 @@
           <a:p>
             <a:fld id="{CFEFF436-BCE8-4AA8-BD26-8FDC39A20978}" type="datetimeFigureOut">
               <a:rPr lang="en-US" smtClean="0"/>
-              <a:t>11/3/2011</a:t>
+              <a:t>11/10/2011</a:t>
             </a:fld>
             <a:endParaRPr lang="en-US"/>
           </a:p>
@@ -1605,7 +1605,7 @@
           <a:p>
             <a:fld id="{CFEFF436-BCE8-4AA8-BD26-8FDC39A20978}" type="datetimeFigureOut">
               <a:rPr lang="en-US" smtClean="0"/>
-              <a:t>11/3/2011</a:t>
+              <a:t>11/10/2011</a:t>
             </a:fld>
             <a:endParaRPr lang="en-US"/>
           </a:p>
@@ -2027,7 +2027,7 @@
           <a:p>
             <a:fld id="{CFEFF436-BCE8-4AA8-BD26-8FDC39A20978}" type="datetimeFigureOut">
               <a:rPr lang="en-US" smtClean="0"/>
-              <a:t>11/3/2011</a:t>
+              <a:t>11/10/2011</a:t>
             </a:fld>
             <a:endParaRPr lang="en-US"/>
           </a:p>
@@ -2145,7 +2145,7 @@
           <a:p>
             <a:fld id="{CFEFF436-BCE8-4AA8-BD26-8FDC39A20978}" type="datetimeFigureOut">
               <a:rPr lang="en-US" smtClean="0"/>
-              <a:t>11/3/2011</a:t>
+              <a:t>11/10/2011</a:t>
             </a:fld>
             <a:endParaRPr lang="en-US"/>
           </a:p>
@@ -2240,7 +2240,7 @@
           <a:p>
             <a:fld id="{CFEFF436-BCE8-4AA8-BD26-8FDC39A20978}" type="datetimeFigureOut">
               <a:rPr lang="en-US" smtClean="0"/>
-              <a:t>11/3/2011</a:t>
+              <a:t>11/10/2011</a:t>
             </a:fld>
             <a:endParaRPr lang="en-US"/>
           </a:p>
@@ -2517,7 +2517,7 @@
           <a:p>
             <a:fld id="{CFEFF436-BCE8-4AA8-BD26-8FDC39A20978}" type="datetimeFigureOut">
               <a:rPr lang="en-US" smtClean="0"/>
-              <a:t>11/3/2011</a:t>
+              <a:t>11/10/2011</a:t>
             </a:fld>
             <a:endParaRPr lang="en-US"/>
           </a:p>
@@ -2698,7 +2698,7 @@
             <a:fld id="{1D8BD707-D9CF-40AE-B4C6-C98DA3205C09}" type="datetimeFigureOut">
               <a:rPr lang="en-US" smtClean="0"/>
               <a:pPr/>
-              <a:t>11/3/2011</a:t>
+              <a:t>11/10/2011</a:t>
             </a:fld>
             <a:endParaRPr lang="en-US"/>
           </a:p>
@@ -2952,7 +2952,7 @@
           <a:p>
             <a:fld id="{CFEFF436-BCE8-4AA8-BD26-8FDC39A20978}" type="datetimeFigureOut">
               <a:rPr lang="en-US" smtClean="0"/>
-              <a:t>11/3/2011</a:t>
+              <a:t>11/10/2011</a:t>
             </a:fld>
             <a:endParaRPr lang="en-US"/>
           </a:p>
@@ -3122,7 +3122,7 @@
           <a:p>
             <a:fld id="{CFEFF436-BCE8-4AA8-BD26-8FDC39A20978}" type="datetimeFigureOut">
               <a:rPr lang="en-US" smtClean="0"/>
-              <a:t>11/3/2011</a:t>
+              <a:t>11/10/2011</a:t>
             </a:fld>
             <a:endParaRPr lang="en-US"/>
           </a:p>
@@ -3302,7 +3302,7 @@
           <a:p>
             <a:fld id="{CFEFF436-BCE8-4AA8-BD26-8FDC39A20978}" type="datetimeFigureOut">
               <a:rPr lang="en-US" smtClean="0"/>
-              <a:t>11/3/2011</a:t>
+              <a:t>11/10/2011</a:t>
             </a:fld>
             <a:endParaRPr lang="en-US"/>
           </a:p>
@@ -6120,7 +6120,7 @@
           <a:p>
             <a:fld id="{CFEFF436-BCE8-4AA8-BD26-8FDC39A20978}" type="datetimeFigureOut">
               <a:rPr lang="en-US" smtClean="0"/>
-              <a:t>11/3/2011</a:t>
+              <a:t>11/10/2011</a:t>
             </a:fld>
             <a:endParaRPr lang="en-US"/>
           </a:p>
@@ -6405,7 +6405,7 @@
           <a:p>
             <a:fld id="{CFEFF436-BCE8-4AA8-BD26-8FDC39A20978}" type="datetimeFigureOut">
               <a:rPr lang="en-US" smtClean="0"/>
-              <a:t>11/3/2011</a:t>
+              <a:t>11/10/2011</a:t>
             </a:fld>
             <a:endParaRPr lang="en-US"/>
           </a:p>
@@ -6646,7 +6646,7 @@
           <a:p>
             <a:fld id="{CFEFF436-BCE8-4AA8-BD26-8FDC39A20978}" type="datetimeFigureOut">
               <a:rPr lang="en-US" smtClean="0"/>
-              <a:t>11/3/2011</a:t>
+              <a:t>11/10/2011</a:t>
             </a:fld>
             <a:endParaRPr lang="en-US"/>
           </a:p>
@@ -6759,7 +6759,7 @@
           <a:p>
             <a:fld id="{CFEFF436-BCE8-4AA8-BD26-8FDC39A20978}" type="datetimeFigureOut">
               <a:rPr lang="en-US" smtClean="0"/>
-              <a:t>11/3/2011</a:t>
+              <a:t>11/10/2011</a:t>
             </a:fld>
             <a:endParaRPr lang="en-US"/>
           </a:p>
@@ -7298,7 +7298,7 @@
           <a:p>
             <a:fld id="{CFEFF436-BCE8-4AA8-BD26-8FDC39A20978}" type="datetimeFigureOut">
               <a:rPr lang="en-US" smtClean="0"/>
-              <a:t>11/3/2011</a:t>
+              <a:t>11/10/2011</a:t>
             </a:fld>
             <a:endParaRPr lang="en-US"/>
           </a:p>
@@ -7384,13 +7384,17 @@
         <p:spPr/>
         <p:txBody>
           <a:bodyPr/>
-          <a:lstStyle/>
-          <a:p>
-            <a:r>
-              <a:rPr lang="en-US" smtClean="0"/>
+          <a:lstStyle>
+            <a:lvl1pPr>
+              <a:defRPr b="1" i="1" strike="noStrike"/>
+            </a:lvl1pPr>
+          </a:lstStyle>
+          <a:p>
+            <a:r>
+              <a:rPr lang="en-US" dirty="0" smtClean="0"/>
               <a:t>Click to edit Master title style</a:t>
             </a:r>
-            <a:endParaRPr lang="en-US"/>
+            <a:endParaRPr lang="en-US" dirty="0"/>
           </a:p>
         </p:txBody>
       </p:sp>
@@ -7411,7 +7415,7 @@
           <a:p>
             <a:fld id="{CFEFF436-BCE8-4AA8-BD26-8FDC39A20978}" type="datetimeFigureOut">
               <a:rPr lang="en-US" smtClean="0"/>
-              <a:t>11/3/2011</a:t>
+              <a:t>11/10/2011</a:t>
             </a:fld>
             <a:endParaRPr lang="en-US"/>
           </a:p>
@@ -7501,7 +7505,7 @@
           <a:p>
             <a:fld id="{CFEFF436-BCE8-4AA8-BD26-8FDC39A20978}" type="datetimeFigureOut">
               <a:rPr lang="en-US" smtClean="0"/>
-              <a:t>11/3/2011</a:t>
+              <a:t>11/10/2011</a:t>
             </a:fld>
             <a:endParaRPr lang="en-US"/>
           </a:p>
@@ -7743,7 +7747,7 @@
             <a:fld id="{1D8BD707-D9CF-40AE-B4C6-C98DA3205C09}" type="datetimeFigureOut">
               <a:rPr lang="en-US" smtClean="0"/>
               <a:pPr/>
-              <a:t>11/3/2011</a:t>
+              <a:t>11/10/2011</a:t>
             </a:fld>
             <a:endParaRPr lang="en-US"/>
           </a:p>
@@ -10400,7 +10404,7 @@
           <a:p>
             <a:fld id="{CFEFF436-BCE8-4AA8-BD26-8FDC39A20978}" type="datetimeFigureOut">
               <a:rPr lang="en-US" smtClean="0"/>
-              <a:t>11/3/2011</a:t>
+              <a:t>11/10/2011</a:t>
             </a:fld>
             <a:endParaRPr lang="en-US"/>
           </a:p>
@@ -13612,7 +13616,7 @@
           <a:p>
             <a:fld id="{CFEFF436-BCE8-4AA8-BD26-8FDC39A20978}" type="datetimeFigureOut">
               <a:rPr lang="en-US" smtClean="0"/>
-              <a:t>11/3/2011</a:t>
+              <a:t>11/10/2011</a:t>
             </a:fld>
             <a:endParaRPr lang="en-US"/>
           </a:p>
@@ -13784,7 +13788,7 @@
           <a:p>
             <a:fld id="{CFEFF436-BCE8-4AA8-BD26-8FDC39A20978}" type="datetimeFigureOut">
               <a:rPr lang="en-US" smtClean="0"/>
-              <a:t>11/3/2011</a:t>
+              <a:t>11/10/2011</a:t>
             </a:fld>
             <a:endParaRPr lang="en-US"/>
           </a:p>
@@ -13959,7 +13963,7 @@
           <a:p>
             <a:fld id="{CFEFF436-BCE8-4AA8-BD26-8FDC39A20978}" type="datetimeFigureOut">
               <a:rPr lang="en-US" smtClean="0"/>
-              <a:t>11/3/2011</a:t>
+              <a:t>11/10/2011</a:t>
             </a:fld>
             <a:endParaRPr lang="en-US"/>
           </a:p>
@@ -14196,7 +14200,7 @@
           <a:p>
             <a:fld id="{5EB0F969-D97C-47F0-959B-1F93DF784EEB}" type="datetimeFigureOut">
               <a:rPr lang="en-US" smtClean="0"/>
-              <a:t>11/3/2011</a:t>
+              <a:t>11/10/2011</a:t>
             </a:fld>
             <a:endParaRPr lang="en-US"/>
           </a:p>
@@ -14366,7 +14370,7 @@
           <a:p>
             <a:fld id="{5EB0F969-D97C-47F0-959B-1F93DF784EEB}" type="datetimeFigureOut">
               <a:rPr lang="en-US" smtClean="0"/>
-              <a:t>11/3/2011</a:t>
+              <a:t>11/10/2011</a:t>
             </a:fld>
             <a:endParaRPr lang="en-US"/>
           </a:p>
@@ -14612,7 +14616,7 @@
           <a:p>
             <a:fld id="{5EB0F969-D97C-47F0-959B-1F93DF784EEB}" type="datetimeFigureOut">
               <a:rPr lang="en-US" smtClean="0"/>
-              <a:t>11/3/2011</a:t>
+              <a:t>11/10/2011</a:t>
             </a:fld>
             <a:endParaRPr lang="en-US"/>
           </a:p>
@@ -14900,7 +14904,7 @@
           <a:p>
             <a:fld id="{5EB0F969-D97C-47F0-959B-1F93DF784EEB}" type="datetimeFigureOut">
               <a:rPr lang="en-US" smtClean="0"/>
-              <a:t>11/3/2011</a:t>
+              <a:t>11/10/2011</a:t>
             </a:fld>
             <a:endParaRPr lang="en-US"/>
           </a:p>
@@ -15322,7 +15326,7 @@
           <a:p>
             <a:fld id="{5EB0F969-D97C-47F0-959B-1F93DF784EEB}" type="datetimeFigureOut">
               <a:rPr lang="en-US" smtClean="0"/>
-              <a:t>11/3/2011</a:t>
+              <a:t>11/10/2011</a:t>
             </a:fld>
             <a:endParaRPr lang="en-US"/>
           </a:p>
@@ -15440,7 +15444,7 @@
           <a:p>
             <a:fld id="{5EB0F969-D97C-47F0-959B-1F93DF784EEB}" type="datetimeFigureOut">
               <a:rPr lang="en-US" smtClean="0"/>
-              <a:t>11/3/2011</a:t>
+              <a:t>11/10/2011</a:t>
             </a:fld>
             <a:endParaRPr lang="en-US"/>
           </a:p>
@@ -15729,7 +15733,7 @@
             <a:fld id="{1D8BD707-D9CF-40AE-B4C6-C98DA3205C09}" type="datetimeFigureOut">
               <a:rPr lang="en-US" smtClean="0"/>
               <a:pPr/>
-              <a:t>11/3/2011</a:t>
+              <a:t>11/10/2011</a:t>
             </a:fld>
             <a:endParaRPr lang="en-US"/>
           </a:p>
@@ -15825,7 +15829,7 @@
           <a:p>
             <a:fld id="{5EB0F969-D97C-47F0-959B-1F93DF784EEB}" type="datetimeFigureOut">
               <a:rPr lang="en-US" smtClean="0"/>
-              <a:t>11/3/2011</a:t>
+              <a:t>11/10/2011</a:t>
             </a:fld>
             <a:endParaRPr lang="en-US"/>
           </a:p>
@@ -16102,7 +16106,7 @@
           <a:p>
             <a:fld id="{5EB0F969-D97C-47F0-959B-1F93DF784EEB}" type="datetimeFigureOut">
               <a:rPr lang="en-US" smtClean="0"/>
-              <a:t>11/3/2011</a:t>
+              <a:t>11/10/2011</a:t>
             </a:fld>
             <a:endParaRPr lang="en-US"/>
           </a:p>
@@ -16355,7 +16359,7 @@
           <a:p>
             <a:fld id="{5EB0F969-D97C-47F0-959B-1F93DF784EEB}" type="datetimeFigureOut">
               <a:rPr lang="en-US" smtClean="0"/>
-              <a:t>11/3/2011</a:t>
+              <a:t>11/10/2011</a:t>
             </a:fld>
             <a:endParaRPr lang="en-US"/>
           </a:p>
@@ -16525,7 +16529,7 @@
           <a:p>
             <a:fld id="{5EB0F969-D97C-47F0-959B-1F93DF784EEB}" type="datetimeFigureOut">
               <a:rPr lang="en-US" smtClean="0"/>
-              <a:t>11/3/2011</a:t>
+              <a:t>11/10/2011</a:t>
             </a:fld>
             <a:endParaRPr lang="en-US"/>
           </a:p>
@@ -16705,7 +16709,7 @@
           <a:p>
             <a:fld id="{5EB0F969-D97C-47F0-959B-1F93DF784EEB}" type="datetimeFigureOut">
               <a:rPr lang="en-US" smtClean="0"/>
-              <a:t>11/3/2011</a:t>
+              <a:t>11/10/2011</a:t>
             </a:fld>
             <a:endParaRPr lang="en-US"/>
           </a:p>
@@ -16941,7 +16945,7 @@
           <a:p>
             <a:fld id="{5EB0F969-D97C-47F0-959B-1F93DF784EEB}" type="datetimeFigureOut">
               <a:rPr lang="en-US" smtClean="0"/>
-              <a:t>11/3/2011</a:t>
+              <a:t>11/10/2011</a:t>
             </a:fld>
             <a:endParaRPr lang="en-US"/>
           </a:p>
@@ -17111,7 +17115,7 @@
           <a:p>
             <a:fld id="{5EB0F969-D97C-47F0-959B-1F93DF784EEB}" type="datetimeFigureOut">
               <a:rPr lang="en-US" smtClean="0"/>
-              <a:t>11/3/2011</a:t>
+              <a:t>11/10/2011</a:t>
             </a:fld>
             <a:endParaRPr lang="en-US"/>
           </a:p>
@@ -17345,7 +17349,7 @@
           <a:p>
             <a:fld id="{5EB0F969-D97C-47F0-959B-1F93DF784EEB}" type="datetimeFigureOut">
               <a:rPr lang="en-US" smtClean="0"/>
-              <a:t>11/3/2011</a:t>
+              <a:t>11/10/2011</a:t>
             </a:fld>
             <a:endParaRPr lang="en-US"/>
           </a:p>
@@ -17641,7 +17645,7 @@
           <a:p>
             <a:fld id="{5EB0F969-D97C-47F0-959B-1F93DF784EEB}" type="datetimeFigureOut">
               <a:rPr lang="en-US" smtClean="0"/>
-              <a:t>11/3/2011</a:t>
+              <a:t>11/10/2011</a:t>
             </a:fld>
             <a:endParaRPr lang="en-US"/>
           </a:p>
@@ -18025,7 +18029,7 @@
           <a:p>
             <a:fld id="{5EB0F969-D97C-47F0-959B-1F93DF784EEB}" type="datetimeFigureOut">
               <a:rPr lang="en-US" smtClean="0"/>
-              <a:t>11/3/2011</a:t>
+              <a:t>11/10/2011</a:t>
             </a:fld>
             <a:endParaRPr lang="en-US"/>
           </a:p>
@@ -18498,7 +18502,7 @@
             <a:fld id="{1D8BD707-D9CF-40AE-B4C6-C98DA3205C09}" type="datetimeFigureOut">
               <a:rPr lang="en-US" smtClean="0"/>
               <a:pPr/>
-              <a:t>11/3/2011</a:t>
+              <a:t>11/10/2011</a:t>
             </a:fld>
             <a:endParaRPr lang="en-US"/>
           </a:p>
@@ -18622,7 +18626,7 @@
           <a:p>
             <a:fld id="{5EB0F969-D97C-47F0-959B-1F93DF784EEB}" type="datetimeFigureOut">
               <a:rPr lang="en-US" smtClean="0"/>
-              <a:t>11/3/2011</a:t>
+              <a:t>11/10/2011</a:t>
             </a:fld>
             <a:endParaRPr lang="en-US"/>
           </a:p>
@@ -18712,7 +18716,7 @@
           <a:p>
             <a:fld id="{5EB0F969-D97C-47F0-959B-1F93DF784EEB}" type="datetimeFigureOut">
               <a:rPr lang="en-US" smtClean="0"/>
-              <a:t>11/3/2011</a:t>
+              <a:t>11/10/2011</a:t>
             </a:fld>
             <a:endParaRPr lang="en-US"/>
           </a:p>
@@ -19007,7 +19011,7 @@
           <a:p>
             <a:fld id="{5EB0F969-D97C-47F0-959B-1F93DF784EEB}" type="datetimeFigureOut">
               <a:rPr lang="en-US" smtClean="0"/>
-              <a:t>11/3/2011</a:t>
+              <a:t>11/10/2011</a:t>
             </a:fld>
             <a:endParaRPr lang="en-US"/>
           </a:p>
@@ -19141,7 +19145,7 @@
           <a:p>
             <a:fld id="{5EB0F969-D97C-47F0-959B-1F93DF784EEB}" type="datetimeFigureOut">
               <a:rPr lang="en-US" smtClean="0"/>
-              <a:t>11/3/2011</a:t>
+              <a:t>11/10/2011</a:t>
             </a:fld>
             <a:endParaRPr lang="en-US"/>
           </a:p>
@@ -19384,7 +19388,7 @@
           <a:p>
             <a:fld id="{5EB0F969-D97C-47F0-959B-1F93DF784EEB}" type="datetimeFigureOut">
               <a:rPr lang="en-US" smtClean="0"/>
-              <a:t>11/3/2011</a:t>
+              <a:t>11/10/2011</a:t>
             </a:fld>
             <a:endParaRPr lang="en-US"/>
           </a:p>
@@ -19559,7 +19563,7 @@
           <a:p>
             <a:fld id="{5EB0F969-D97C-47F0-959B-1F93DF784EEB}" type="datetimeFigureOut">
               <a:rPr lang="en-US" smtClean="0"/>
-              <a:t>11/3/2011</a:t>
+              <a:t>11/10/2011</a:t>
             </a:fld>
             <a:endParaRPr lang="en-US"/>
           </a:p>
@@ -19796,7 +19800,7 @@
           <a:p>
             <a:fld id="{4146A0F6-7C0E-49A4-AA7E-2FA288A5AB7B}" type="datetimeFigureOut">
               <a:rPr lang="en-US" smtClean="0"/>
-              <a:t>11/3/2011</a:t>
+              <a:t>11/10/2011</a:t>
             </a:fld>
             <a:endParaRPr lang="en-US"/>
           </a:p>
@@ -19966,7 +19970,7 @@
           <a:p>
             <a:fld id="{4146A0F6-7C0E-49A4-AA7E-2FA288A5AB7B}" type="datetimeFigureOut">
               <a:rPr lang="en-US" smtClean="0"/>
-              <a:t>11/3/2011</a:t>
+              <a:t>11/10/2011</a:t>
             </a:fld>
             <a:endParaRPr lang="en-US"/>
           </a:p>
@@ -20212,7 +20216,7 @@
           <a:p>
             <a:fld id="{4146A0F6-7C0E-49A4-AA7E-2FA288A5AB7B}" type="datetimeFigureOut">
               <a:rPr lang="en-US" smtClean="0"/>
-              <a:t>11/3/2011</a:t>
+              <a:t>11/10/2011</a:t>
             </a:fld>
             <a:endParaRPr lang="en-US"/>
           </a:p>
@@ -20500,7 +20504,7 @@
           <a:p>
             <a:fld id="{4146A0F6-7C0E-49A4-AA7E-2FA288A5AB7B}" type="datetimeFigureOut">
               <a:rPr lang="en-US" smtClean="0"/>
-              <a:t>11/3/2011</a:t>
+              <a:t>11/10/2011</a:t>
             </a:fld>
             <a:endParaRPr lang="en-US"/>
           </a:p>
@@ -20624,7 +20628,7 @@
             <a:fld id="{1D8BD707-D9CF-40AE-B4C6-C98DA3205C09}" type="datetimeFigureOut">
               <a:rPr lang="en-US" smtClean="0"/>
               <a:pPr/>
-              <a:t>11/3/2011</a:t>
+              <a:t>11/10/2011</a:t>
             </a:fld>
             <a:endParaRPr lang="en-US"/>
           </a:p>
@@ -21047,7 +21051,7 @@
           <a:p>
             <a:fld id="{4146A0F6-7C0E-49A4-AA7E-2FA288A5AB7B}" type="datetimeFigureOut">
               <a:rPr lang="en-US" smtClean="0"/>
-              <a:t>11/3/2011</a:t>
+              <a:t>11/10/2011</a:t>
             </a:fld>
             <a:endParaRPr lang="en-US"/>
           </a:p>
@@ -21165,7 +21169,7 @@
           <a:p>
             <a:fld id="{4146A0F6-7C0E-49A4-AA7E-2FA288A5AB7B}" type="datetimeFigureOut">
               <a:rPr lang="en-US" smtClean="0"/>
-              <a:t>11/3/2011</a:t>
+              <a:t>11/10/2011</a:t>
             </a:fld>
             <a:endParaRPr lang="en-US"/>
           </a:p>
@@ -21260,7 +21264,7 @@
           <a:p>
             <a:fld id="{4146A0F6-7C0E-49A4-AA7E-2FA288A5AB7B}" type="datetimeFigureOut">
               <a:rPr lang="en-US" smtClean="0"/>
-              <a:t>11/3/2011</a:t>
+              <a:t>11/10/2011</a:t>
             </a:fld>
             <a:endParaRPr lang="en-US"/>
           </a:p>
@@ -21537,7 +21541,7 @@
           <a:p>
             <a:fld id="{4146A0F6-7C0E-49A4-AA7E-2FA288A5AB7B}" type="datetimeFigureOut">
               <a:rPr lang="en-US" smtClean="0"/>
-              <a:t>11/3/2011</a:t>
+              <a:t>11/10/2011</a:t>
             </a:fld>
             <a:endParaRPr lang="en-US"/>
           </a:p>
@@ -21790,7 +21794,7 @@
           <a:p>
             <a:fld id="{4146A0F6-7C0E-49A4-AA7E-2FA288A5AB7B}" type="datetimeFigureOut">
               <a:rPr lang="en-US" smtClean="0"/>
-              <a:t>11/3/2011</a:t>
+              <a:t>11/10/2011</a:t>
             </a:fld>
             <a:endParaRPr lang="en-US"/>
           </a:p>
@@ -21960,7 +21964,7 @@
           <a:p>
             <a:fld id="{4146A0F6-7C0E-49A4-AA7E-2FA288A5AB7B}" type="datetimeFigureOut">
               <a:rPr lang="en-US" smtClean="0"/>
-              <a:t>11/3/2011</a:t>
+              <a:t>11/10/2011</a:t>
             </a:fld>
             <a:endParaRPr lang="en-US"/>
           </a:p>
@@ -22140,7 +22144,7 @@
           <a:p>
             <a:fld id="{4146A0F6-7C0E-49A4-AA7E-2FA288A5AB7B}" type="datetimeFigureOut">
               <a:rPr lang="en-US" smtClean="0"/>
-              <a:t>11/3/2011</a:t>
+              <a:t>11/10/2011</a:t>
             </a:fld>
             <a:endParaRPr lang="en-US"/>
           </a:p>
@@ -22390,7 +22394,7 @@
           <a:p>
             <a:fld id="{4146A0F6-7C0E-49A4-AA7E-2FA288A5AB7B}" type="datetimeFigureOut">
               <a:rPr lang="en-US" smtClean="0"/>
-              <a:t>11/3/2011</a:t>
+              <a:t>11/10/2011</a:t>
             </a:fld>
             <a:endParaRPr lang="en-US"/>
           </a:p>
@@ -22544,7 +22548,7 @@
           <a:p>
             <a:fld id="{4146A0F6-7C0E-49A4-AA7E-2FA288A5AB7B}" type="datetimeFigureOut">
               <a:rPr lang="en-US" smtClean="0"/>
-              <a:t>11/3/2011</a:t>
+              <a:t>11/10/2011</a:t>
             </a:fld>
             <a:endParaRPr lang="en-US"/>
           </a:p>
@@ -22819,7 +22823,7 @@
           <a:p>
             <a:fld id="{4146A0F6-7C0E-49A4-AA7E-2FA288A5AB7B}" type="datetimeFigureOut">
               <a:rPr lang="en-US" smtClean="0"/>
-              <a:t>11/3/2011</a:t>
+              <a:t>11/10/2011</a:t>
             </a:fld>
             <a:endParaRPr lang="en-US"/>
           </a:p>
@@ -22917,7 +22921,7 @@
             <a:fld id="{1D8BD707-D9CF-40AE-B4C6-C98DA3205C09}" type="datetimeFigureOut">
               <a:rPr lang="en-US" smtClean="0"/>
               <a:pPr/>
-              <a:t>11/3/2011</a:t>
+              <a:t>11/10/2011</a:t>
             </a:fld>
             <a:endParaRPr lang="en-US"/>
           </a:p>
@@ -23215,7 +23219,7 @@
           <a:p>
             <a:fld id="{4146A0F6-7C0E-49A4-AA7E-2FA288A5AB7B}" type="datetimeFigureOut">
               <a:rPr lang="en-US" smtClean="0"/>
-              <a:t>11/3/2011</a:t>
+              <a:t>11/10/2011</a:t>
             </a:fld>
             <a:endParaRPr lang="en-US"/>
           </a:p>
@@ -23657,7 +23661,7 @@
           <a:p>
             <a:fld id="{4146A0F6-7C0E-49A4-AA7E-2FA288A5AB7B}" type="datetimeFigureOut">
               <a:rPr lang="en-US" smtClean="0"/>
-              <a:t>11/3/2011</a:t>
+              <a:t>11/10/2011</a:t>
             </a:fld>
             <a:endParaRPr lang="en-US"/>
           </a:p>
@@ -23764,7 +23768,7 @@
           <a:p>
             <a:fld id="{4146A0F6-7C0E-49A4-AA7E-2FA288A5AB7B}" type="datetimeFigureOut">
               <a:rPr lang="en-US" smtClean="0"/>
-              <a:t>11/3/2011</a:t>
+              <a:t>11/10/2011</a:t>
             </a:fld>
             <a:endParaRPr lang="en-US"/>
           </a:p>
@@ -23884,7 +23888,7 @@
           <a:p>
             <a:fld id="{4146A0F6-7C0E-49A4-AA7E-2FA288A5AB7B}" type="datetimeFigureOut">
               <a:rPr lang="en-US" smtClean="0"/>
-              <a:t>11/3/2011</a:t>
+              <a:t>11/10/2011</a:t>
             </a:fld>
             <a:endParaRPr lang="en-US"/>
           </a:p>
@@ -24169,7 +24173,7 @@
           <a:p>
             <a:fld id="{4146A0F6-7C0E-49A4-AA7E-2FA288A5AB7B}" type="datetimeFigureOut">
               <a:rPr lang="en-US" smtClean="0"/>
-              <a:t>11/3/2011</a:t>
+              <a:t>11/10/2011</a:t>
             </a:fld>
             <a:endParaRPr lang="en-US"/>
           </a:p>
@@ -24440,7 +24444,7 @@
           <a:p>
             <a:fld id="{4146A0F6-7C0E-49A4-AA7E-2FA288A5AB7B}" type="datetimeFigureOut">
               <a:rPr lang="en-US" smtClean="0"/>
-              <a:t>11/3/2011</a:t>
+              <a:t>11/10/2011</a:t>
             </a:fld>
             <a:endParaRPr lang="en-US"/>
           </a:p>
@@ -24622,7 +24626,7 @@
           <a:p>
             <a:fld id="{4146A0F6-7C0E-49A4-AA7E-2FA288A5AB7B}" type="datetimeFigureOut">
               <a:rPr lang="en-US" smtClean="0"/>
-              <a:t>11/3/2011</a:t>
+              <a:t>11/10/2011</a:t>
             </a:fld>
             <a:endParaRPr lang="en-US"/>
           </a:p>
@@ -24820,7 +24824,7 @@
           <a:p>
             <a:fld id="{4146A0F6-7C0E-49A4-AA7E-2FA288A5AB7B}" type="datetimeFigureOut">
               <a:rPr lang="en-US" smtClean="0"/>
-              <a:t>11/3/2011</a:t>
+              <a:t>11/10/2011</a:t>
             </a:fld>
             <a:endParaRPr lang="en-US"/>
           </a:p>
@@ -25100,7 +25104,7 @@
             <a:fld id="{1D8BD707-D9CF-40AE-B4C6-C98DA3205C09}" type="datetimeFigureOut">
               <a:rPr lang="en-US" smtClean="0"/>
               <a:pPr/>
-              <a:t>11/3/2011</a:t>
+              <a:t>11/10/2011</a:t>
             </a:fld>
             <a:endParaRPr lang="en-US"/>
           </a:p>
@@ -25355,7 +25359,7 @@
             <a:fld id="{1D8BD707-D9CF-40AE-B4C6-C98DA3205C09}" type="datetimeFigureOut">
               <a:rPr lang="en-US" smtClean="0"/>
               <a:pPr/>
-              <a:t>11/3/2011</a:t>
+              <a:t>11/10/2011</a:t>
             </a:fld>
             <a:endParaRPr lang="en-US"/>
           </a:p>
@@ -25570,7 +25574,7 @@
             <a:fld id="{1D8BD707-D9CF-40AE-B4C6-C98DA3205C09}" type="datetimeFigureOut">
               <a:rPr lang="en-US" smtClean="0"/>
               <a:pPr/>
-              <a:t>11/3/2011</a:t>
+              <a:t>11/10/2011</a:t>
             </a:fld>
             <a:endParaRPr lang="en-US"/>
           </a:p>
@@ -26081,7 +26085,7 @@
           <a:p>
             <a:fld id="{CFEFF436-BCE8-4AA8-BD26-8FDC39A20978}" type="datetimeFigureOut">
               <a:rPr lang="en-US" smtClean="0"/>
-              <a:t>11/3/2011</a:t>
+              <a:t>11/10/2011</a:t>
             </a:fld>
             <a:endParaRPr lang="en-US"/>
           </a:p>
@@ -29199,7 +29203,7 @@
             <a:fld id="{1D8BD707-D9CF-40AE-B4C6-C98DA3205C09}" type="datetimeFigureOut">
               <a:rPr lang="en-US" smtClean="0"/>
               <a:pPr/>
-              <a:t>11/3/2011</a:t>
+              <a:t>11/10/2011</a:t>
             </a:fld>
             <a:endParaRPr lang="en-US"/>
           </a:p>
@@ -29793,7 +29797,7 @@
           <a:p>
             <a:fld id="{5EB0F969-D97C-47F0-959B-1F93DF784EEB}" type="datetimeFigureOut">
               <a:rPr lang="en-US" smtClean="0"/>
-              <a:t>11/3/2011</a:t>
+              <a:t>11/10/2011</a:t>
             </a:fld>
             <a:endParaRPr lang="en-US"/>
           </a:p>
@@ -30321,7 +30325,7 @@
             <a:fld id="{1D8BD707-D9CF-40AE-B4C6-C98DA3205C09}" type="datetimeFigureOut">
               <a:rPr lang="en-US" smtClean="0"/>
               <a:pPr/>
-              <a:t>11/3/2011</a:t>
+              <a:t>11/10/2011</a:t>
             </a:fld>
             <a:endParaRPr lang="en-US"/>
           </a:p>
@@ -30996,7 +31000,7 @@
           <a:p>
             <a:fld id="{4146A0F6-7C0E-49A4-AA7E-2FA288A5AB7B}" type="datetimeFigureOut">
               <a:rPr lang="en-US" smtClean="0"/>
-              <a:t>11/3/2011</a:t>
+              <a:t>11/10/2011</a:t>
             </a:fld>
             <a:endParaRPr lang="en-US"/>
           </a:p>
@@ -31507,7 +31511,7 @@
             <a:fld id="{1D8BD707-D9CF-40AE-B4C6-C98DA3205C09}" type="datetimeFigureOut">
               <a:rPr lang="en-US" smtClean="0"/>
               <a:pPr/>
-              <a:t>11/3/2011</a:t>
+              <a:t>11/10/2011</a:t>
             </a:fld>
             <a:endParaRPr lang="en-US"/>
           </a:p>
@@ -32258,11 +32262,7 @@
           <a:p>
             <a:r>
               <a:rPr lang="en-US" dirty="0" smtClean="0"/>
-              <a:t>Radial Gradient </a:t>
-            </a:r>
-            <a:r>
-              <a:rPr lang="en-US" dirty="0" smtClean="0"/>
-              <a:t>Fill On Slide Layout</a:t>
+              <a:t>Radial Gradient Fill On Slide Layout</a:t>
             </a:r>
             <a:endParaRPr lang="en-US" dirty="0"/>
           </a:p>
@@ -32315,11 +32315,7 @@
           <a:p>
             <a:r>
               <a:rPr lang="en-US" dirty="0" smtClean="0"/>
-              <a:t>Austin </a:t>
-            </a:r>
-            <a:r>
-              <a:rPr lang="en-US" dirty="0" smtClean="0"/>
-              <a:t>Theme</a:t>
+              <a:t>Austin Theme</a:t>
             </a:r>
             <a:endParaRPr lang="en-US" dirty="0"/>
           </a:p>
@@ -32448,6 +32444,36 @@
           </a:p>
         </p:txBody>
       </p:sp>
+      <p:pic>
+        <p:nvPicPr>
+          <p:cNvPr id="4" name="Picture 3"/>
+          <p:cNvPicPr>
+            <a:picLocks noChangeAspect="1"/>
+          </p:cNvPicPr>
+          <p:nvPr/>
+        </p:nvPicPr>
+        <p:blipFill>
+          <a:blip r:embed="rId3">
+            <a:extLst>
+              <a:ext uri="{28A0092B-C50C-407E-A947-70E740481C1C}">
+                <a14:useLocalDpi xmlns:a14="http://schemas.microsoft.com/office/drawing/2010/main" val="0"/>
+              </a:ext>
+            </a:extLst>
+          </a:blip>
+          <a:stretch>
+            <a:fillRect/>
+          </a:stretch>
+        </p:blipFill>
+        <p:spPr>
+          <a:xfrm>
+            <a:off x="3352800" y="3276600"/>
+            <a:ext cx="1828800" cy="1676400"/>
+          </a:xfrm>
+          <a:prstGeom prst="rect">
+            <a:avLst/>
+          </a:prstGeom>
+        </p:spPr>
+      </p:pic>
     </p:spTree>
     <p:extLst>
       <p:ext uri="{BB962C8B-B14F-4D97-AF65-F5344CB8AC3E}">
@@ -32610,15 +32636,7 @@
             </a:pPr>
             <a:r>
               <a:rPr lang="en-US" dirty="0" smtClean="0"/>
-              <a:t>Slide </a:t>
-            </a:r>
-            <a:r>
-              <a:rPr lang="en-US" dirty="0" smtClean="0"/>
-              <a:t>background overrides </a:t>
-            </a:r>
-            <a:r>
-              <a:rPr lang="en-US" dirty="0" smtClean="0"/>
-              <a:t>slide master.</a:t>
+              <a:t>Slide background overrides slide master.</a:t>
             </a:r>
           </a:p>
           <a:p>

</xml_diff>